<commit_message>
modif ppt et css
</commit_message>
<xml_diff>
--- a/Présentation/Présentation Site.pptx
+++ b/Présentation/Présentation Site.pptx
@@ -411,7 +411,7 @@
             <a:fld id="{B41ABA4E-CD72-497B-97AA-7213B3980F60}" type="datetimeFigureOut">
               <a:rPr lang="en-US" smtClean="0"/>
               <a:pPr eaLnBrk="1" latinLnBrk="0" hangingPunct="1"/>
-              <a:t>2/2/2018</a:t>
+              <a:t>2/5/2018</a:t>
             </a:fld>
             <a:endParaRPr lang="en-US" dirty="0"/>
           </a:p>
@@ -579,7 +579,7 @@
             <a:fld id="{B41ABA4E-CD72-497B-97AA-7213B3980F60}" type="datetimeFigureOut">
               <a:rPr lang="en-US" smtClean="0"/>
               <a:pPr eaLnBrk="1" latinLnBrk="0" hangingPunct="1"/>
-              <a:t>2/2/2018</a:t>
+              <a:t>2/5/2018</a:t>
             </a:fld>
             <a:endParaRPr lang="en-US" dirty="0"/>
           </a:p>
@@ -757,7 +757,7 @@
             <a:fld id="{B41ABA4E-CD72-497B-97AA-7213B3980F60}" type="datetimeFigureOut">
               <a:rPr lang="en-US" smtClean="0"/>
               <a:pPr eaLnBrk="1" latinLnBrk="0" hangingPunct="1"/>
-              <a:t>2/2/2018</a:t>
+              <a:t>2/5/2018</a:t>
             </a:fld>
             <a:endParaRPr lang="en-US" dirty="0"/>
           </a:p>
@@ -908,7 +908,7 @@
             <a:fld id="{B41ABA4E-CD72-497B-97AA-7213B3980F60}" type="datetimeFigureOut">
               <a:rPr lang="en-US" smtClean="0"/>
               <a:pPr eaLnBrk="1" latinLnBrk="0" hangingPunct="1"/>
-              <a:t>2/2/2018</a:t>
+              <a:t>2/5/2018</a:t>
             </a:fld>
             <a:endParaRPr lang="en-US" dirty="0"/>
           </a:p>
@@ -1028,7 +1028,7 @@
             <a:fld id="{B41ABA4E-CD72-497B-97AA-7213B3980F60}" type="datetimeFigureOut">
               <a:rPr lang="en-US" smtClean="0"/>
               <a:pPr eaLnBrk="1" latinLnBrk="0" hangingPunct="1"/>
-              <a:t>2/2/2018</a:t>
+              <a:t>2/5/2018</a:t>
             </a:fld>
             <a:endParaRPr lang="en-US" dirty="0"/>
           </a:p>
@@ -1301,7 +1301,7 @@
             <a:fld id="{B41ABA4E-CD72-497B-97AA-7213B3980F60}" type="datetimeFigureOut">
               <a:rPr lang="en-US" smtClean="0"/>
               <a:pPr eaLnBrk="1" latinLnBrk="0" hangingPunct="1"/>
-              <a:t>2/2/2018</a:t>
+              <a:t>2/5/2018</a:t>
             </a:fld>
             <a:endParaRPr lang="en-US" dirty="0"/>
           </a:p>
@@ -1575,7 +1575,7 @@
             <a:fld id="{B41ABA4E-CD72-497B-97AA-7213B3980F60}" type="datetimeFigureOut">
               <a:rPr lang="en-US" smtClean="0"/>
               <a:pPr eaLnBrk="1" latinLnBrk="0" hangingPunct="1"/>
-              <a:t>2/2/2018</a:t>
+              <a:t>2/5/2018</a:t>
             </a:fld>
             <a:endParaRPr lang="en-US" dirty="0"/>
           </a:p>
@@ -2023,7 +2023,7 @@
             <a:fld id="{B41ABA4E-CD72-497B-97AA-7213B3980F60}" type="datetimeFigureOut">
               <a:rPr lang="en-US" smtClean="0"/>
               <a:pPr eaLnBrk="1" latinLnBrk="0" hangingPunct="1"/>
-              <a:t>2/2/2018</a:t>
+              <a:t>2/5/2018</a:t>
             </a:fld>
             <a:endParaRPr lang="en-US" dirty="0"/>
           </a:p>
@@ -2139,7 +2139,7 @@
             <a:fld id="{B41ABA4E-CD72-497B-97AA-7213B3980F60}" type="datetimeFigureOut">
               <a:rPr lang="en-US" smtClean="0"/>
               <a:pPr eaLnBrk="1" latinLnBrk="0" hangingPunct="1"/>
-              <a:t>2/2/2018</a:t>
+              <a:t>2/5/2018</a:t>
             </a:fld>
             <a:endParaRPr lang="en-US" dirty="0"/>
           </a:p>
@@ -2392,7 +2392,7 @@
             <a:fld id="{B41ABA4E-CD72-497B-97AA-7213B3980F60}" type="datetimeFigureOut">
               <a:rPr lang="en-US" smtClean="0"/>
               <a:pPr eaLnBrk="1" latinLnBrk="0" hangingPunct="1"/>
-              <a:t>2/2/2018</a:t>
+              <a:t>2/5/2018</a:t>
             </a:fld>
             <a:endParaRPr lang="en-US" dirty="0"/>
           </a:p>
@@ -2634,7 +2634,7 @@
             <a:fld id="{B41ABA4E-CD72-497B-97AA-7213B3980F60}" type="datetimeFigureOut">
               <a:rPr lang="en-US" smtClean="0"/>
               <a:pPr eaLnBrk="1" latinLnBrk="0" hangingPunct="1"/>
-              <a:t>2/2/2018</a:t>
+              <a:t>2/5/2018</a:t>
             </a:fld>
             <a:endParaRPr lang="en-US" dirty="0"/>
           </a:p>
@@ -2810,7 +2810,7 @@
             <a:fld id="{B41ABA4E-CD72-497B-97AA-7213B3980F60}" type="datetimeFigureOut">
               <a:rPr lang="en-US" smtClean="0"/>
               <a:pPr eaLnBrk="1" latinLnBrk="0" hangingPunct="1"/>
-              <a:t>2/2/2018</a:t>
+              <a:t>2/5/2018</a:t>
             </a:fld>
             <a:endParaRPr lang="en-US" dirty="0"/>
           </a:p>
@@ -3412,10 +3412,10 @@
       </p:sp>
       <p:pic>
         <p:nvPicPr>
-          <p:cNvPr id="5" name="Image 4">
+          <p:cNvPr id="6" name="Image 5">
             <a:extLst>
               <a:ext uri="{FF2B5EF4-FFF2-40B4-BE49-F238E27FC236}">
-                <a16:creationId xmlns:a16="http://schemas.microsoft.com/office/drawing/2014/main" id="{37BD7F12-DF22-4A41-8687-50039E8B071E}"/>
+                <a16:creationId xmlns:a16="http://schemas.microsoft.com/office/drawing/2014/main" id="{4E80CF39-B97C-48A6-A77B-047C0653B86A}"/>
               </a:ext>
             </a:extLst>
           </p:cNvPr>
@@ -3438,8 +3438,8 @@
         </p:blipFill>
         <p:spPr>
           <a:xfrm>
-            <a:off x="409575" y="290951"/>
-            <a:ext cx="8401050" cy="2133381"/>
+            <a:off x="202811" y="178972"/>
+            <a:ext cx="8738377" cy="2398199"/>
           </a:xfrm>
           <a:prstGeom prst="rect">
             <a:avLst/>
@@ -3918,6 +3918,301 @@
   <p:clrMapOvr>
     <a:masterClrMapping/>
   </p:clrMapOvr>
+  <p:timing>
+    <p:tnLst>
+      <p:par>
+        <p:cTn id="1" dur="indefinite" restart="never" nodeType="tmRoot">
+          <p:childTnLst>
+            <p:seq concurrent="1" nextAc="seek">
+              <p:cTn id="2" dur="indefinite" nodeType="mainSeq">
+                <p:childTnLst>
+                  <p:par>
+                    <p:cTn id="3" fill="hold">
+                      <p:stCondLst>
+                        <p:cond delay="indefinite"/>
+                      </p:stCondLst>
+                      <p:childTnLst>
+                        <p:par>
+                          <p:cTn id="4" fill="hold">
+                            <p:stCondLst>
+                              <p:cond delay="0"/>
+                            </p:stCondLst>
+                            <p:childTnLst>
+                              <p:par>
+                                <p:cTn id="5" presetID="10" presetClass="entr" presetSubtype="0" fill="hold" nodeType="clickEffect">
+                                  <p:stCondLst>
+                                    <p:cond delay="0"/>
+                                  </p:stCondLst>
+                                  <p:childTnLst>
+                                    <p:set>
+                                      <p:cBhvr>
+                                        <p:cTn id="6" dur="1" fill="hold">
+                                          <p:stCondLst>
+                                            <p:cond delay="0"/>
+                                          </p:stCondLst>
+                                        </p:cTn>
+                                        <p:tgtEl>
+                                          <p:spTgt spid="5"/>
+                                        </p:tgtEl>
+                                        <p:attrNameLst>
+                                          <p:attrName>style.visibility</p:attrName>
+                                        </p:attrNameLst>
+                                      </p:cBhvr>
+                                      <p:to>
+                                        <p:strVal val="visible"/>
+                                      </p:to>
+                                    </p:set>
+                                    <p:animEffect transition="in" filter="fade">
+                                      <p:cBhvr>
+                                        <p:cTn id="7" dur="1250"/>
+                                        <p:tgtEl>
+                                          <p:spTgt spid="5"/>
+                                        </p:tgtEl>
+                                      </p:cBhvr>
+                                    </p:animEffect>
+                                  </p:childTnLst>
+                                </p:cTn>
+                              </p:par>
+                            </p:childTnLst>
+                          </p:cTn>
+                        </p:par>
+                      </p:childTnLst>
+                    </p:cTn>
+                  </p:par>
+                  <p:par>
+                    <p:cTn id="8" fill="hold">
+                      <p:stCondLst>
+                        <p:cond delay="indefinite"/>
+                      </p:stCondLst>
+                      <p:childTnLst>
+                        <p:par>
+                          <p:cTn id="9" fill="hold">
+                            <p:stCondLst>
+                              <p:cond delay="0"/>
+                            </p:stCondLst>
+                            <p:childTnLst>
+                              <p:par>
+                                <p:cTn id="10" presetID="10" presetClass="entr" presetSubtype="0" fill="hold" nodeType="clickEffect">
+                                  <p:stCondLst>
+                                    <p:cond delay="0"/>
+                                  </p:stCondLst>
+                                  <p:childTnLst>
+                                    <p:set>
+                                      <p:cBhvr>
+                                        <p:cTn id="11" dur="1" fill="hold">
+                                          <p:stCondLst>
+                                            <p:cond delay="0"/>
+                                          </p:stCondLst>
+                                        </p:cTn>
+                                        <p:tgtEl>
+                                          <p:spTgt spid="19"/>
+                                        </p:tgtEl>
+                                        <p:attrNameLst>
+                                          <p:attrName>style.visibility</p:attrName>
+                                        </p:attrNameLst>
+                                      </p:cBhvr>
+                                      <p:to>
+                                        <p:strVal val="visible"/>
+                                      </p:to>
+                                    </p:set>
+                                    <p:animEffect transition="in" filter="fade">
+                                      <p:cBhvr>
+                                        <p:cTn id="12" dur="1250"/>
+                                        <p:tgtEl>
+                                          <p:spTgt spid="19"/>
+                                        </p:tgtEl>
+                                      </p:cBhvr>
+                                    </p:animEffect>
+                                  </p:childTnLst>
+                                </p:cTn>
+                              </p:par>
+                            </p:childTnLst>
+                          </p:cTn>
+                        </p:par>
+                      </p:childTnLst>
+                    </p:cTn>
+                  </p:par>
+                  <p:par>
+                    <p:cTn id="13" fill="hold">
+                      <p:stCondLst>
+                        <p:cond delay="indefinite"/>
+                      </p:stCondLst>
+                      <p:childTnLst>
+                        <p:par>
+                          <p:cTn id="14" fill="hold">
+                            <p:stCondLst>
+                              <p:cond delay="0"/>
+                            </p:stCondLst>
+                            <p:childTnLst>
+                              <p:par>
+                                <p:cTn id="15" presetID="10" presetClass="entr" presetSubtype="0" fill="hold" nodeType="clickEffect">
+                                  <p:stCondLst>
+                                    <p:cond delay="0"/>
+                                  </p:stCondLst>
+                                  <p:childTnLst>
+                                    <p:set>
+                                      <p:cBhvr>
+                                        <p:cTn id="16" dur="1" fill="hold">
+                                          <p:stCondLst>
+                                            <p:cond delay="0"/>
+                                          </p:stCondLst>
+                                        </p:cTn>
+                                        <p:tgtEl>
+                                          <p:spTgt spid="21"/>
+                                        </p:tgtEl>
+                                        <p:attrNameLst>
+                                          <p:attrName>style.visibility</p:attrName>
+                                        </p:attrNameLst>
+                                      </p:cBhvr>
+                                      <p:to>
+                                        <p:strVal val="visible"/>
+                                      </p:to>
+                                    </p:set>
+                                    <p:animEffect transition="in" filter="fade">
+                                      <p:cBhvr>
+                                        <p:cTn id="17" dur="1250"/>
+                                        <p:tgtEl>
+                                          <p:spTgt spid="21"/>
+                                        </p:tgtEl>
+                                      </p:cBhvr>
+                                    </p:animEffect>
+                                  </p:childTnLst>
+                                </p:cTn>
+                              </p:par>
+                            </p:childTnLst>
+                          </p:cTn>
+                        </p:par>
+                      </p:childTnLst>
+                    </p:cTn>
+                  </p:par>
+                  <p:par>
+                    <p:cTn id="18" fill="hold">
+                      <p:stCondLst>
+                        <p:cond delay="indefinite"/>
+                      </p:stCondLst>
+                      <p:childTnLst>
+                        <p:par>
+                          <p:cTn id="19" fill="hold">
+                            <p:stCondLst>
+                              <p:cond delay="0"/>
+                            </p:stCondLst>
+                            <p:childTnLst>
+                              <p:par>
+                                <p:cTn id="20" presetID="10" presetClass="entr" presetSubtype="0" fill="hold" nodeType="clickEffect">
+                                  <p:stCondLst>
+                                    <p:cond delay="0"/>
+                                  </p:stCondLst>
+                                  <p:childTnLst>
+                                    <p:set>
+                                      <p:cBhvr>
+                                        <p:cTn id="21" dur="1" fill="hold">
+                                          <p:stCondLst>
+                                            <p:cond delay="0"/>
+                                          </p:stCondLst>
+                                        </p:cTn>
+                                        <p:tgtEl>
+                                          <p:spTgt spid="11"/>
+                                        </p:tgtEl>
+                                        <p:attrNameLst>
+                                          <p:attrName>style.visibility</p:attrName>
+                                        </p:attrNameLst>
+                                      </p:cBhvr>
+                                      <p:to>
+                                        <p:strVal val="visible"/>
+                                      </p:to>
+                                    </p:set>
+                                    <p:animEffect transition="in" filter="fade">
+                                      <p:cBhvr>
+                                        <p:cTn id="22" dur="1250"/>
+                                        <p:tgtEl>
+                                          <p:spTgt spid="11"/>
+                                        </p:tgtEl>
+                                      </p:cBhvr>
+                                    </p:animEffect>
+                                  </p:childTnLst>
+                                </p:cTn>
+                              </p:par>
+                            </p:childTnLst>
+                          </p:cTn>
+                        </p:par>
+                      </p:childTnLst>
+                    </p:cTn>
+                  </p:par>
+                  <p:par>
+                    <p:cTn id="23" fill="hold">
+                      <p:stCondLst>
+                        <p:cond delay="indefinite"/>
+                      </p:stCondLst>
+                      <p:childTnLst>
+                        <p:par>
+                          <p:cTn id="24" fill="hold">
+                            <p:stCondLst>
+                              <p:cond delay="0"/>
+                            </p:stCondLst>
+                            <p:childTnLst>
+                              <p:par>
+                                <p:cTn id="25" presetID="10" presetClass="entr" presetSubtype="0" fill="hold" nodeType="clickEffect">
+                                  <p:stCondLst>
+                                    <p:cond delay="0"/>
+                                  </p:stCondLst>
+                                  <p:childTnLst>
+                                    <p:set>
+                                      <p:cBhvr>
+                                        <p:cTn id="26" dur="1" fill="hold">
+                                          <p:stCondLst>
+                                            <p:cond delay="0"/>
+                                          </p:stCondLst>
+                                        </p:cTn>
+                                        <p:tgtEl>
+                                          <p:spTgt spid="7"/>
+                                        </p:tgtEl>
+                                        <p:attrNameLst>
+                                          <p:attrName>style.visibility</p:attrName>
+                                        </p:attrNameLst>
+                                      </p:cBhvr>
+                                      <p:to>
+                                        <p:strVal val="visible"/>
+                                      </p:to>
+                                    </p:set>
+                                    <p:animEffect transition="in" filter="fade">
+                                      <p:cBhvr>
+                                        <p:cTn id="27" dur="1250"/>
+                                        <p:tgtEl>
+                                          <p:spTgt spid="7"/>
+                                        </p:tgtEl>
+                                      </p:cBhvr>
+                                    </p:animEffect>
+                                  </p:childTnLst>
+                                </p:cTn>
+                              </p:par>
+                            </p:childTnLst>
+                          </p:cTn>
+                        </p:par>
+                      </p:childTnLst>
+                    </p:cTn>
+                  </p:par>
+                </p:childTnLst>
+              </p:cTn>
+              <p:prevCondLst>
+                <p:cond evt="onPrev" delay="0">
+                  <p:tgtEl>
+                    <p:sldTgt/>
+                  </p:tgtEl>
+                </p:cond>
+              </p:prevCondLst>
+              <p:nextCondLst>
+                <p:cond evt="onNext" delay="0">
+                  <p:tgtEl>
+                    <p:sldTgt/>
+                  </p:tgtEl>
+                </p:cond>
+              </p:nextCondLst>
+            </p:seq>
+          </p:childTnLst>
+        </p:cTn>
+      </p:par>
+    </p:tnLst>
+  </p:timing>
 </p:sld>
 </file>
 
@@ -4221,6 +4516,18 @@
   <p:clrMapOvr>
     <a:masterClrMapping/>
   </p:clrMapOvr>
+  <mc:AlternateContent xmlns:mc="http://schemas.openxmlformats.org/markup-compatibility/2006">
+    <mc:Choice xmlns:p15="http://schemas.microsoft.com/office/powerpoint/2012/main" Requires="p15">
+      <p:transition xmlns:p14="http://schemas.microsoft.com/office/powerpoint/2010/main" spd="slow" p14:dur="2500">
+        <p15:prstTrans prst="fallOver"/>
+      </p:transition>
+    </mc:Choice>
+    <mc:Fallback>
+      <p:transition spd="slow">
+        <p:fade/>
+      </p:transition>
+    </mc:Fallback>
+  </mc:AlternateContent>
 </p:sld>
 </file>
 

</xml_diff>